<commit_message>
Working but needs to be tuned
</commit_message>
<xml_diff>
--- a/Docs/New Microsoft PowerPoint Presentation.pptx
+++ b/Docs/New Microsoft PowerPoint Presentation.pptx
@@ -107,6 +107,11 @@
       </a:defRPr>
     </a:lvl9pPr>
   </p:defaultTextStyle>
+  <p:extLst>
+    <p:ext uri="{EFAFB233-063F-42B5-8137-9DF3F51BA10A}">
+      <p15:sldGuideLst xmlns:p15="http://schemas.microsoft.com/office/powerpoint/2012/main"/>
+    </p:ext>
+  </p:extLst>
 </p:presentation>
 </file>
 
@@ -192,7 +197,7 @@
           <a:p>
             <a:fld id="{8654794C-8E7C-4927-83CD-1C01701BFCC6}" type="datetimeFigureOut">
               <a:rPr lang="en-US" smtClean="0"/>
-              <a:t>1/30/2019</a:t>
+              <a:t>2/2/2019</a:t>
             </a:fld>
             <a:endParaRPr lang="en-US"/>
           </a:p>
@@ -675,7 +680,7 @@
           <a:p>
             <a:fld id="{6455DF3D-2D53-4D55-AAA5-0D8947C1C717}" type="datetimeFigureOut">
               <a:rPr lang="en-US" smtClean="0"/>
-              <a:t>1/30/2019</a:t>
+              <a:t>2/2/2019</a:t>
             </a:fld>
             <a:endParaRPr lang="en-US"/>
           </a:p>
@@ -845,7 +850,7 @@
           <a:p>
             <a:fld id="{6455DF3D-2D53-4D55-AAA5-0D8947C1C717}" type="datetimeFigureOut">
               <a:rPr lang="en-US" smtClean="0"/>
-              <a:t>1/30/2019</a:t>
+              <a:t>2/2/2019</a:t>
             </a:fld>
             <a:endParaRPr lang="en-US"/>
           </a:p>
@@ -1025,7 +1030,7 @@
           <a:p>
             <a:fld id="{6455DF3D-2D53-4D55-AAA5-0D8947C1C717}" type="datetimeFigureOut">
               <a:rPr lang="en-US" smtClean="0"/>
-              <a:t>1/30/2019</a:t>
+              <a:t>2/2/2019</a:t>
             </a:fld>
             <a:endParaRPr lang="en-US"/>
           </a:p>
@@ -1195,7 +1200,7 @@
           <a:p>
             <a:fld id="{6455DF3D-2D53-4D55-AAA5-0D8947C1C717}" type="datetimeFigureOut">
               <a:rPr lang="en-US" smtClean="0"/>
-              <a:t>1/30/2019</a:t>
+              <a:t>2/2/2019</a:t>
             </a:fld>
             <a:endParaRPr lang="en-US"/>
           </a:p>
@@ -1441,7 +1446,7 @@
           <a:p>
             <a:fld id="{6455DF3D-2D53-4D55-AAA5-0D8947C1C717}" type="datetimeFigureOut">
               <a:rPr lang="en-US" smtClean="0"/>
-              <a:t>1/30/2019</a:t>
+              <a:t>2/2/2019</a:t>
             </a:fld>
             <a:endParaRPr lang="en-US"/>
           </a:p>
@@ -1673,7 +1678,7 @@
           <a:p>
             <a:fld id="{6455DF3D-2D53-4D55-AAA5-0D8947C1C717}" type="datetimeFigureOut">
               <a:rPr lang="en-US" smtClean="0"/>
-              <a:t>1/30/2019</a:t>
+              <a:t>2/2/2019</a:t>
             </a:fld>
             <a:endParaRPr lang="en-US"/>
           </a:p>
@@ -2040,7 +2045,7 @@
           <a:p>
             <a:fld id="{6455DF3D-2D53-4D55-AAA5-0D8947C1C717}" type="datetimeFigureOut">
               <a:rPr lang="en-US" smtClean="0"/>
-              <a:t>1/30/2019</a:t>
+              <a:t>2/2/2019</a:t>
             </a:fld>
             <a:endParaRPr lang="en-US"/>
           </a:p>
@@ -2158,7 +2163,7 @@
           <a:p>
             <a:fld id="{6455DF3D-2D53-4D55-AAA5-0D8947C1C717}" type="datetimeFigureOut">
               <a:rPr lang="en-US" smtClean="0"/>
-              <a:t>1/30/2019</a:t>
+              <a:t>2/2/2019</a:t>
             </a:fld>
             <a:endParaRPr lang="en-US"/>
           </a:p>
@@ -2253,7 +2258,7 @@
           <a:p>
             <a:fld id="{6455DF3D-2D53-4D55-AAA5-0D8947C1C717}" type="datetimeFigureOut">
               <a:rPr lang="en-US" smtClean="0"/>
-              <a:t>1/30/2019</a:t>
+              <a:t>2/2/2019</a:t>
             </a:fld>
             <a:endParaRPr lang="en-US"/>
           </a:p>
@@ -2530,7 +2535,7 @@
           <a:p>
             <a:fld id="{6455DF3D-2D53-4D55-AAA5-0D8947C1C717}" type="datetimeFigureOut">
               <a:rPr lang="en-US" smtClean="0"/>
-              <a:t>1/30/2019</a:t>
+              <a:t>2/2/2019</a:t>
             </a:fld>
             <a:endParaRPr lang="en-US"/>
           </a:p>
@@ -2783,7 +2788,7 @@
           <a:p>
             <a:fld id="{6455DF3D-2D53-4D55-AAA5-0D8947C1C717}" type="datetimeFigureOut">
               <a:rPr lang="en-US" smtClean="0"/>
-              <a:t>1/30/2019</a:t>
+              <a:t>2/2/2019</a:t>
             </a:fld>
             <a:endParaRPr lang="en-US"/>
           </a:p>
@@ -2996,7 +3001,7 @@
           <a:p>
             <a:fld id="{6455DF3D-2D53-4D55-AAA5-0D8947C1C717}" type="datetimeFigureOut">
               <a:rPr lang="en-US" smtClean="0"/>
-              <a:t>1/30/2019</a:t>
+              <a:t>2/2/2019</a:t>
             </a:fld>
             <a:endParaRPr lang="en-US"/>
           </a:p>
@@ -3491,6 +3496,39 @@
           </a:prstGeom>
         </p:spPr>
       </p:pic>
+      <p:sp>
+        <p:nvSpPr>
+          <p:cNvPr id="2" name="Rectangle 1"/>
+          <p:cNvSpPr/>
+          <p:nvPr/>
+        </p:nvSpPr>
+        <p:spPr>
+          <a:xfrm rot="16200000">
+            <a:off x="-2089437" y="2876487"/>
+            <a:ext cx="4876912" cy="369332"/>
+          </a:xfrm>
+          <a:prstGeom prst="rect">
+            <a:avLst/>
+          </a:prstGeom>
+        </p:spPr>
+        <p:txBody>
+          <a:bodyPr wrap="none">
+            <a:spAutoFit/>
+          </a:bodyPr>
+          <a:lstStyle/>
+          <a:p>
+            <a:r>
+              <a:rPr lang="en-US" dirty="0"/>
+              <a:t>Triple 2-channel analog multiplexer/</a:t>
+            </a:r>
+            <a:r>
+              <a:rPr lang="en-US" dirty="0" err="1"/>
+              <a:t>demultiplexer</a:t>
+            </a:r>
+            <a:endParaRPr lang="en-US" dirty="0"/>
+          </a:p>
+        </p:txBody>
+      </p:sp>
     </p:spTree>
     <p:extLst>
       <p:ext uri="{BB962C8B-B14F-4D97-AF65-F5344CB8AC3E}">

</xml_diff>